<commit_message>
season report 2022 update
</commit_message>
<xml_diff>
--- a/reports/season-review/template/rfl-report-template.pptx
+++ b/reports/season-review/template/rfl-report-template.pptx
@@ -5,10 +5,14 @@
     <p:sldMasterId id="2147483660" r:id="rId1"/>
   </p:sldMasterIdLst>
   <p:notesMasterIdLst>
-    <p:notesMasterId r:id="rId3"/>
+    <p:notesMasterId r:id="rId4"/>
   </p:notesMasterIdLst>
+  <p:handoutMasterIdLst>
+    <p:handoutMasterId r:id="rId5"/>
+  </p:handoutMasterIdLst>
   <p:sldIdLst>
     <p:sldId id="256" r:id="rId2"/>
+    <p:sldId id="257" r:id="rId3"/>
   </p:sldIdLst>
   <p:sldSz cx="12192000" cy="6858000"/>
   <p:notesSz cx="6858000" cy="9144000"/>
@@ -111,8 +115,200 @@
     <p:ext uri="{EFAFB233-063F-42B5-8137-9DF3F51BA10A}">
       <p15:sldGuideLst xmlns:p15="http://schemas.microsoft.com/office/powerpoint/2012/main"/>
     </p:ext>
+    <p:ext uri="{2D200454-40CA-4A62-9FC3-DE9A4176ACB9}">
+      <p15:notesGuideLst xmlns:p15="http://schemas.microsoft.com/office/powerpoint/2012/main"/>
+    </p:ext>
   </p:extLst>
 </p:presentation>
+</file>
+
+<file path=ppt/handoutMasters/handoutMaster1.xml><?xml version="1.0" encoding="utf-8"?>
+<p:handoutMaster xmlns:a="http://schemas.openxmlformats.org/drawingml/2006/main" xmlns:r="http://schemas.openxmlformats.org/officeDocument/2006/relationships" xmlns:p="http://schemas.openxmlformats.org/presentationml/2006/main">
+  <p:cSld>
+    <p:bg>
+      <p:bgRef idx="1001">
+        <a:schemeClr val="bg1"/>
+      </p:bgRef>
+    </p:bg>
+    <p:spTree>
+      <p:nvGrpSpPr>
+        <p:cNvPr id="1" name=""/>
+        <p:cNvGrpSpPr/>
+        <p:nvPr/>
+      </p:nvGrpSpPr>
+      <p:grpSpPr>
+        <a:xfrm>
+          <a:off x="0" y="0"/>
+          <a:ext cx="0" cy="0"/>
+          <a:chOff x="0" y="0"/>
+          <a:chExt cx="0" cy="0"/>
+        </a:xfrm>
+      </p:grpSpPr>
+      <p:sp>
+        <p:nvSpPr>
+          <p:cNvPr id="2" name="Kopfzeilenplatzhalter 1">
+            <a:extLst>
+              <a:ext uri="{FF2B5EF4-FFF2-40B4-BE49-F238E27FC236}">
+                <a16:creationId xmlns:a16="http://schemas.microsoft.com/office/drawing/2014/main" id="{25025AAD-3B32-FC38-C0C2-9947E023B85C}"/>
+              </a:ext>
+            </a:extLst>
+          </p:cNvPr>
+          <p:cNvSpPr>
+            <a:spLocks noGrp="1"/>
+          </p:cNvSpPr>
+          <p:nvPr>
+            <p:ph type="hdr" sz="quarter"/>
+          </p:nvPr>
+        </p:nvSpPr>
+        <p:spPr>
+          <a:xfrm>
+            <a:off x="0" y="0"/>
+            <a:ext cx="2971800" cy="458788"/>
+          </a:xfrm>
+          <a:prstGeom prst="rect">
+            <a:avLst/>
+          </a:prstGeom>
+        </p:spPr>
+        <p:txBody>
+          <a:bodyPr vert="horz" lIns="91440" tIns="45720" rIns="91440" bIns="45720" rtlCol="0"/>
+          <a:lstStyle>
+            <a:lvl1pPr algn="l">
+              <a:defRPr sz="1200"/>
+            </a:lvl1pPr>
+          </a:lstStyle>
+          <a:p>
+            <a:endParaRPr lang="de-DE"/>
+          </a:p>
+        </p:txBody>
+      </p:sp>
+      <p:sp>
+        <p:nvSpPr>
+          <p:cNvPr id="3" name="Datumsplatzhalter 2">
+            <a:extLst>
+              <a:ext uri="{FF2B5EF4-FFF2-40B4-BE49-F238E27FC236}">
+                <a16:creationId xmlns:a16="http://schemas.microsoft.com/office/drawing/2014/main" id="{061C75FB-8CCE-B45D-C1E0-A2FAFE3F77C2}"/>
+              </a:ext>
+            </a:extLst>
+          </p:cNvPr>
+          <p:cNvSpPr>
+            <a:spLocks noGrp="1"/>
+          </p:cNvSpPr>
+          <p:nvPr>
+            <p:ph type="dt" sz="quarter" idx="1"/>
+          </p:nvPr>
+        </p:nvSpPr>
+        <p:spPr>
+          <a:xfrm>
+            <a:off x="3884613" y="0"/>
+            <a:ext cx="2971800" cy="458788"/>
+          </a:xfrm>
+          <a:prstGeom prst="rect">
+            <a:avLst/>
+          </a:prstGeom>
+        </p:spPr>
+        <p:txBody>
+          <a:bodyPr vert="horz" lIns="91440" tIns="45720" rIns="91440" bIns="45720" rtlCol="0"/>
+          <a:lstStyle>
+            <a:lvl1pPr algn="r">
+              <a:defRPr sz="1200"/>
+            </a:lvl1pPr>
+          </a:lstStyle>
+          <a:p>
+            <a:fld id="{20A7F67E-9F3A-4DEE-A0E5-76D5CAD1EC86}" type="datetimeFigureOut">
+              <a:rPr lang="de-DE" smtClean="0"/>
+              <a:t>29.04.2023</a:t>
+            </a:fld>
+            <a:endParaRPr lang="de-DE"/>
+          </a:p>
+        </p:txBody>
+      </p:sp>
+      <p:sp>
+        <p:nvSpPr>
+          <p:cNvPr id="4" name="Fußzeilenplatzhalter 3">
+            <a:extLst>
+              <a:ext uri="{FF2B5EF4-FFF2-40B4-BE49-F238E27FC236}">
+                <a16:creationId xmlns:a16="http://schemas.microsoft.com/office/drawing/2014/main" id="{CC95F080-9558-E96A-2B73-422E94B05E00}"/>
+              </a:ext>
+            </a:extLst>
+          </p:cNvPr>
+          <p:cNvSpPr>
+            <a:spLocks noGrp="1"/>
+          </p:cNvSpPr>
+          <p:nvPr>
+            <p:ph type="ftr" sz="quarter" idx="2"/>
+          </p:nvPr>
+        </p:nvSpPr>
+        <p:spPr>
+          <a:xfrm>
+            <a:off x="0" y="8685213"/>
+            <a:ext cx="2971800" cy="458787"/>
+          </a:xfrm>
+          <a:prstGeom prst="rect">
+            <a:avLst/>
+          </a:prstGeom>
+        </p:spPr>
+        <p:txBody>
+          <a:bodyPr vert="horz" lIns="91440" tIns="45720" rIns="91440" bIns="45720" rtlCol="0" anchor="b"/>
+          <a:lstStyle>
+            <a:lvl1pPr algn="l">
+              <a:defRPr sz="1200"/>
+            </a:lvl1pPr>
+          </a:lstStyle>
+          <a:p>
+            <a:endParaRPr lang="de-DE"/>
+          </a:p>
+        </p:txBody>
+      </p:sp>
+      <p:sp>
+        <p:nvSpPr>
+          <p:cNvPr id="5" name="Foliennummernplatzhalter 4">
+            <a:extLst>
+              <a:ext uri="{FF2B5EF4-FFF2-40B4-BE49-F238E27FC236}">
+                <a16:creationId xmlns:a16="http://schemas.microsoft.com/office/drawing/2014/main" id="{6E1459F0-3688-BF01-4711-92D08F78B8CF}"/>
+              </a:ext>
+            </a:extLst>
+          </p:cNvPr>
+          <p:cNvSpPr>
+            <a:spLocks noGrp="1"/>
+          </p:cNvSpPr>
+          <p:nvPr>
+            <p:ph type="sldNum" sz="quarter" idx="3"/>
+          </p:nvPr>
+        </p:nvSpPr>
+        <p:spPr>
+          <a:xfrm>
+            <a:off x="3884613" y="8685213"/>
+            <a:ext cx="2971800" cy="458787"/>
+          </a:xfrm>
+          <a:prstGeom prst="rect">
+            <a:avLst/>
+          </a:prstGeom>
+        </p:spPr>
+        <p:txBody>
+          <a:bodyPr vert="horz" lIns="91440" tIns="45720" rIns="91440" bIns="45720" rtlCol="0" anchor="b"/>
+          <a:lstStyle>
+            <a:lvl1pPr algn="r">
+              <a:defRPr sz="1200"/>
+            </a:lvl1pPr>
+          </a:lstStyle>
+          <a:p>
+            <a:fld id="{03BB8ADE-0837-4CF6-807A-798CC3B2D132}" type="slidenum">
+              <a:rPr lang="de-DE" smtClean="0"/>
+              <a:t>‹Nr.›</a:t>
+            </a:fld>
+            <a:endParaRPr lang="de-DE"/>
+          </a:p>
+        </p:txBody>
+      </p:sp>
+    </p:spTree>
+    <p:extLst>
+      <p:ext uri="{BB962C8B-B14F-4D97-AF65-F5344CB8AC3E}">
+        <p14:creationId xmlns:p14="http://schemas.microsoft.com/office/powerpoint/2010/main" val="2650088634"/>
+      </p:ext>
+    </p:extLst>
+  </p:cSld>
+  <p:clrMap bg1="lt1" tx1="dk1" bg2="lt2" tx2="dk2" accent1="accent1" accent2="accent2" accent3="accent3" accent4="accent4" accent5="accent5" accent6="accent6" hlink="hlink" folHlink="folHlink"/>
+</p:handoutMaster>
 </file>
 
 <file path=ppt/notesMasters/notesMaster1.xml><?xml version="1.0" encoding="utf-8"?>
@@ -197,7 +393,7 @@
           <a:p>
             <a:fld id="{1993ABD0-7F62-4BC2-A2E2-2ACCA9F1B4A7}" type="datetimeFigureOut">
               <a:rPr lang="de-DE" smtClean="0"/>
-              <a:t>14.04.2023</a:t>
+              <a:t>29.04.2023</a:t>
             </a:fld>
             <a:endParaRPr lang="de-DE"/>
           </a:p>
@@ -758,6 +954,381 @@
 </p:sldLayout>
 </file>
 
+<file path=ppt/slideLayouts/slideLayout10.xml><?xml version="1.0" encoding="utf-8"?>
+<p:sldLayout xmlns:a="http://schemas.openxmlformats.org/drawingml/2006/main" xmlns:r="http://schemas.openxmlformats.org/officeDocument/2006/relationships" xmlns:p="http://schemas.openxmlformats.org/presentationml/2006/main" preserve="1" userDrawn="1">
+  <p:cSld name="Inhalt">
+    <p:spTree>
+      <p:nvGrpSpPr>
+        <p:cNvPr id="1" name=""/>
+        <p:cNvGrpSpPr/>
+        <p:nvPr/>
+      </p:nvGrpSpPr>
+      <p:grpSpPr>
+        <a:xfrm>
+          <a:off x="0" y="0"/>
+          <a:ext cx="0" cy="0"/>
+          <a:chOff x="0" y="0"/>
+          <a:chExt cx="0" cy="0"/>
+        </a:xfrm>
+      </p:grpSpPr>
+      <p:grpSp>
+        <p:nvGrpSpPr>
+          <p:cNvPr id="22" name="border">
+            <a:extLst>
+              <a:ext uri="{FF2B5EF4-FFF2-40B4-BE49-F238E27FC236}">
+                <a16:creationId xmlns:a16="http://schemas.microsoft.com/office/drawing/2014/main" id="{B8D0B26B-281F-D7A3-D584-65D016783949}"/>
+              </a:ext>
+            </a:extLst>
+          </p:cNvPr>
+          <p:cNvGrpSpPr/>
+          <p:nvPr userDrawn="1"/>
+        </p:nvGrpSpPr>
+        <p:grpSpPr>
+          <a:xfrm>
+            <a:off x="0" y="-2"/>
+            <a:ext cx="12192000" cy="6858004"/>
+            <a:chOff x="0" y="-2"/>
+            <a:chExt cx="12192000" cy="6858004"/>
+          </a:xfrm>
+          <a:solidFill>
+            <a:schemeClr val="tx1"/>
+          </a:solidFill>
+        </p:grpSpPr>
+        <p:sp>
+          <p:nvSpPr>
+            <p:cNvPr id="23" name="border-left">
+              <a:extLst>
+                <a:ext uri="{FF2B5EF4-FFF2-40B4-BE49-F238E27FC236}">
+                  <a16:creationId xmlns:a16="http://schemas.microsoft.com/office/drawing/2014/main" id="{24D1C0E4-0082-A121-25D9-0C67CB2C0947}"/>
+                </a:ext>
+              </a:extLst>
+            </p:cNvPr>
+            <p:cNvSpPr/>
+            <p:nvPr userDrawn="1"/>
+          </p:nvSpPr>
+          <p:spPr>
+            <a:xfrm>
+              <a:off x="4681" y="0"/>
+              <a:ext cx="180000" cy="6858002"/>
+            </a:xfrm>
+            <a:prstGeom prst="rect">
+              <a:avLst/>
+            </a:prstGeom>
+            <a:grpFill/>
+            <a:ln>
+              <a:noFill/>
+            </a:ln>
+          </p:spPr>
+          <p:style>
+            <a:lnRef idx="2">
+              <a:schemeClr val="accent1">
+                <a:shade val="50000"/>
+              </a:schemeClr>
+            </a:lnRef>
+            <a:fillRef idx="1">
+              <a:schemeClr val="accent1"/>
+            </a:fillRef>
+            <a:effectRef idx="0">
+              <a:schemeClr val="accent1"/>
+            </a:effectRef>
+            <a:fontRef idx="minor">
+              <a:schemeClr val="lt1"/>
+            </a:fontRef>
+          </p:style>
+          <p:txBody>
+            <a:bodyPr rtlCol="0" anchor="ctr"/>
+            <a:lstStyle/>
+            <a:p>
+              <a:pPr algn="ctr"/>
+              <a:endParaRPr lang="de-DE" dirty="0"/>
+            </a:p>
+          </p:txBody>
+        </p:sp>
+        <p:sp>
+          <p:nvSpPr>
+            <p:cNvPr id="24" name="border-bottom">
+              <a:extLst>
+                <a:ext uri="{FF2B5EF4-FFF2-40B4-BE49-F238E27FC236}">
+                  <a16:creationId xmlns:a16="http://schemas.microsoft.com/office/drawing/2014/main" id="{3AC2A2C3-DBE9-EED1-ADED-9550DAF09168}"/>
+                </a:ext>
+              </a:extLst>
+            </p:cNvPr>
+            <p:cNvSpPr/>
+            <p:nvPr userDrawn="1"/>
+          </p:nvSpPr>
+          <p:spPr>
+            <a:xfrm>
+              <a:off x="0" y="6678001"/>
+              <a:ext cx="12145434" cy="180000"/>
+            </a:xfrm>
+            <a:prstGeom prst="rect">
+              <a:avLst/>
+            </a:prstGeom>
+            <a:grpFill/>
+            <a:ln>
+              <a:noFill/>
+            </a:ln>
+          </p:spPr>
+          <p:style>
+            <a:lnRef idx="2">
+              <a:schemeClr val="accent1">
+                <a:shade val="50000"/>
+              </a:schemeClr>
+            </a:lnRef>
+            <a:fillRef idx="1">
+              <a:schemeClr val="accent1"/>
+            </a:fillRef>
+            <a:effectRef idx="0">
+              <a:schemeClr val="accent1"/>
+            </a:effectRef>
+            <a:fontRef idx="minor">
+              <a:schemeClr val="lt1"/>
+            </a:fontRef>
+          </p:style>
+          <p:txBody>
+            <a:bodyPr rtlCol="0" anchor="ctr"/>
+            <a:lstStyle/>
+            <a:p>
+              <a:pPr algn="ctr"/>
+              <a:endParaRPr lang="de-DE" dirty="0"/>
+            </a:p>
+          </p:txBody>
+        </p:sp>
+        <p:sp>
+          <p:nvSpPr>
+            <p:cNvPr id="25" name="border-right">
+              <a:extLst>
+                <a:ext uri="{FF2B5EF4-FFF2-40B4-BE49-F238E27FC236}">
+                  <a16:creationId xmlns:a16="http://schemas.microsoft.com/office/drawing/2014/main" id="{88443614-9F3A-8AE7-F32B-2638B18358B5}"/>
+                </a:ext>
+              </a:extLst>
+            </p:cNvPr>
+            <p:cNvSpPr/>
+            <p:nvPr userDrawn="1"/>
+          </p:nvSpPr>
+          <p:spPr>
+            <a:xfrm>
+              <a:off x="12012000" y="-2"/>
+              <a:ext cx="180000" cy="6858002"/>
+            </a:xfrm>
+            <a:prstGeom prst="rect">
+              <a:avLst/>
+            </a:prstGeom>
+            <a:grpFill/>
+            <a:ln>
+              <a:noFill/>
+            </a:ln>
+          </p:spPr>
+          <p:style>
+            <a:lnRef idx="2">
+              <a:schemeClr val="accent1">
+                <a:shade val="50000"/>
+              </a:schemeClr>
+            </a:lnRef>
+            <a:fillRef idx="1">
+              <a:schemeClr val="accent1"/>
+            </a:fillRef>
+            <a:effectRef idx="0">
+              <a:schemeClr val="accent1"/>
+            </a:effectRef>
+            <a:fontRef idx="minor">
+              <a:schemeClr val="lt1"/>
+            </a:fontRef>
+          </p:style>
+          <p:txBody>
+            <a:bodyPr rtlCol="0" anchor="ctr"/>
+            <a:lstStyle/>
+            <a:p>
+              <a:pPr algn="ctr"/>
+              <a:endParaRPr lang="de-DE" dirty="0"/>
+            </a:p>
+          </p:txBody>
+        </p:sp>
+        <p:sp>
+          <p:nvSpPr>
+            <p:cNvPr id="26" name="border-top">
+              <a:extLst>
+                <a:ext uri="{FF2B5EF4-FFF2-40B4-BE49-F238E27FC236}">
+                  <a16:creationId xmlns:a16="http://schemas.microsoft.com/office/drawing/2014/main" id="{AC40C3CA-D995-E3BD-B3ED-BA688F19C2C4}"/>
+                </a:ext>
+              </a:extLst>
+            </p:cNvPr>
+            <p:cNvSpPr/>
+            <p:nvPr userDrawn="1"/>
+          </p:nvSpPr>
+          <p:spPr>
+            <a:xfrm>
+              <a:off x="0" y="-1"/>
+              <a:ext cx="12192000" cy="180000"/>
+            </a:xfrm>
+            <a:prstGeom prst="rect">
+              <a:avLst/>
+            </a:prstGeom>
+            <a:grpFill/>
+            <a:ln>
+              <a:noFill/>
+            </a:ln>
+          </p:spPr>
+          <p:style>
+            <a:lnRef idx="2">
+              <a:schemeClr val="accent1">
+                <a:shade val="50000"/>
+              </a:schemeClr>
+            </a:lnRef>
+            <a:fillRef idx="1">
+              <a:schemeClr val="accent1"/>
+            </a:fillRef>
+            <a:effectRef idx="0">
+              <a:schemeClr val="accent1"/>
+            </a:effectRef>
+            <a:fontRef idx="minor">
+              <a:schemeClr val="lt1"/>
+            </a:fontRef>
+          </p:style>
+          <p:txBody>
+            <a:bodyPr rtlCol="0" anchor="ctr"/>
+            <a:lstStyle/>
+            <a:p>
+              <a:pPr algn="ctr"/>
+              <a:endParaRPr lang="de-DE" dirty="0"/>
+            </a:p>
+          </p:txBody>
+        </p:sp>
+      </p:grpSp>
+      <p:sp>
+        <p:nvSpPr>
+          <p:cNvPr id="2" name="title">
+            <a:extLst>
+              <a:ext uri="{FF2B5EF4-FFF2-40B4-BE49-F238E27FC236}">
+                <a16:creationId xmlns:a16="http://schemas.microsoft.com/office/drawing/2014/main" id="{4AE85176-057C-9E1E-E17C-7F530410CB2C}"/>
+              </a:ext>
+            </a:extLst>
+          </p:cNvPr>
+          <p:cNvSpPr>
+            <a:spLocks noGrp="1"/>
+          </p:cNvSpPr>
+          <p:nvPr>
+            <p:ph type="title"/>
+          </p:nvPr>
+        </p:nvSpPr>
+        <p:spPr>
+          <a:xfrm>
+            <a:off x="410634" y="382060"/>
+            <a:ext cx="11349566" cy="815974"/>
+          </a:xfrm>
+          <a:prstGeom prst="rect">
+            <a:avLst/>
+          </a:prstGeom>
+        </p:spPr>
+        <p:txBody>
+          <a:bodyPr/>
+          <a:lstStyle>
+            <a:lvl1pPr>
+              <a:defRPr sz="6000"/>
+            </a:lvl1pPr>
+          </a:lstStyle>
+          <a:p>
+            <a:r>
+              <a:rPr lang="de-DE" dirty="0"/>
+              <a:t>Mastertitelformat bearbeiten</a:t>
+            </a:r>
+          </a:p>
+        </p:txBody>
+      </p:sp>
+      <p:sp>
+        <p:nvSpPr>
+          <p:cNvPr id="30" name="content">
+            <a:extLst>
+              <a:ext uri="{FF2B5EF4-FFF2-40B4-BE49-F238E27FC236}">
+                <a16:creationId xmlns:a16="http://schemas.microsoft.com/office/drawing/2014/main" id="{AA2F0873-9110-E430-44EF-097D36A3E36A}"/>
+              </a:ext>
+            </a:extLst>
+          </p:cNvPr>
+          <p:cNvSpPr>
+            <a:spLocks noGrp="1"/>
+          </p:cNvSpPr>
+          <p:nvPr>
+            <p:ph type="body" sz="quarter" idx="11"/>
+          </p:nvPr>
+        </p:nvSpPr>
+        <p:spPr>
+          <a:xfrm>
+            <a:off x="410633" y="1617133"/>
+            <a:ext cx="11349567" cy="4858805"/>
+          </a:xfrm>
+          <a:prstGeom prst="rect">
+            <a:avLst/>
+          </a:prstGeom>
+        </p:spPr>
+        <p:txBody>
+          <a:bodyPr/>
+          <a:lstStyle>
+            <a:lvl1pPr>
+              <a:defRPr sz="2000"/>
+            </a:lvl1pPr>
+            <a:lvl2pPr>
+              <a:defRPr sz="2000"/>
+            </a:lvl2pPr>
+            <a:lvl3pPr>
+              <a:defRPr sz="2000"/>
+            </a:lvl3pPr>
+            <a:lvl4pPr>
+              <a:defRPr sz="2000"/>
+            </a:lvl4pPr>
+            <a:lvl5pPr>
+              <a:defRPr sz="2000"/>
+            </a:lvl5pPr>
+          </a:lstStyle>
+          <a:p>
+            <a:pPr lvl="0"/>
+            <a:r>
+              <a:rPr lang="de-DE" dirty="0"/>
+              <a:t>Mastertextformat bearbeiten</a:t>
+            </a:r>
+          </a:p>
+          <a:p>
+            <a:pPr lvl="1"/>
+            <a:r>
+              <a:rPr lang="de-DE" dirty="0"/>
+              <a:t>Zweite Ebene</a:t>
+            </a:r>
+          </a:p>
+          <a:p>
+            <a:pPr lvl="2"/>
+            <a:r>
+              <a:rPr lang="de-DE" dirty="0"/>
+              <a:t>Dritte Ebene</a:t>
+            </a:r>
+          </a:p>
+          <a:p>
+            <a:pPr lvl="3"/>
+            <a:r>
+              <a:rPr lang="de-DE" dirty="0"/>
+              <a:t>Vierte Ebene</a:t>
+            </a:r>
+          </a:p>
+          <a:p>
+            <a:pPr lvl="4"/>
+            <a:r>
+              <a:rPr lang="de-DE" dirty="0"/>
+              <a:t>Fünfte Ebene</a:t>
+            </a:r>
+          </a:p>
+        </p:txBody>
+      </p:sp>
+    </p:spTree>
+    <p:extLst>
+      <p:ext uri="{BB962C8B-B14F-4D97-AF65-F5344CB8AC3E}">
+        <p14:creationId xmlns:p14="http://schemas.microsoft.com/office/powerpoint/2010/main" val="554388420"/>
+      </p:ext>
+    </p:extLst>
+  </p:cSld>
+  <p:clrMapOvr>
+    <a:masterClrMapping/>
+  </p:clrMapOvr>
+</p:sldLayout>
+</file>
+
 <file path=ppt/slideLayouts/slideLayout2.xml><?xml version="1.0" encoding="utf-8"?>
 <p:sldLayout xmlns:a="http://schemas.openxmlformats.org/drawingml/2006/main" xmlns:r="http://schemas.openxmlformats.org/officeDocument/2006/relationships" xmlns:p="http://schemas.openxmlformats.org/presentationml/2006/main" preserve="1" userDrawn="1">
   <p:cSld name="Liga Awards">
@@ -3062,6 +3633,567 @@
 
 <file path=ppt/slideLayouts/slideLayout8.xml><?xml version="1.0" encoding="utf-8"?>
 <p:sldLayout xmlns:a="http://schemas.openxmlformats.org/drawingml/2006/main" xmlns:r="http://schemas.openxmlformats.org/officeDocument/2006/relationships" xmlns:p="http://schemas.openxmlformats.org/presentationml/2006/main" preserve="1" userDrawn="1">
+  <p:cSld name="Personnel Grouping">
+    <p:spTree>
+      <p:nvGrpSpPr>
+        <p:cNvPr id="1" name=""/>
+        <p:cNvGrpSpPr/>
+        <p:nvPr/>
+      </p:nvGrpSpPr>
+      <p:grpSpPr>
+        <a:xfrm>
+          <a:off x="0" y="0"/>
+          <a:ext cx="0" cy="0"/>
+          <a:chOff x="0" y="0"/>
+          <a:chExt cx="0" cy="0"/>
+        </a:xfrm>
+      </p:grpSpPr>
+      <p:grpSp>
+        <p:nvGrpSpPr>
+          <p:cNvPr id="3" name="border">
+            <a:extLst>
+              <a:ext uri="{FF2B5EF4-FFF2-40B4-BE49-F238E27FC236}">
+                <a16:creationId xmlns:a16="http://schemas.microsoft.com/office/drawing/2014/main" id="{6C1DC067-9397-58CB-2948-4464F21F1DA4}"/>
+              </a:ext>
+            </a:extLst>
+          </p:cNvPr>
+          <p:cNvGrpSpPr/>
+          <p:nvPr userDrawn="1"/>
+        </p:nvGrpSpPr>
+        <p:grpSpPr>
+          <a:xfrm>
+            <a:off x="304" y="55806"/>
+            <a:ext cx="12192000" cy="6858004"/>
+            <a:chOff x="0" y="-2"/>
+            <a:chExt cx="12192000" cy="6858004"/>
+          </a:xfrm>
+          <a:solidFill>
+            <a:schemeClr val="tx1"/>
+          </a:solidFill>
+        </p:grpSpPr>
+        <p:sp>
+          <p:nvSpPr>
+            <p:cNvPr id="4" name="border-left">
+              <a:extLst>
+                <a:ext uri="{FF2B5EF4-FFF2-40B4-BE49-F238E27FC236}">
+                  <a16:creationId xmlns:a16="http://schemas.microsoft.com/office/drawing/2014/main" id="{989D3EF2-26F0-4793-D53C-C851F299850D}"/>
+                </a:ext>
+              </a:extLst>
+            </p:cNvPr>
+            <p:cNvSpPr/>
+            <p:nvPr userDrawn="1"/>
+          </p:nvSpPr>
+          <p:spPr>
+            <a:xfrm>
+              <a:off x="4681" y="0"/>
+              <a:ext cx="180000" cy="6858002"/>
+            </a:xfrm>
+            <a:prstGeom prst="rect">
+              <a:avLst/>
+            </a:prstGeom>
+            <a:grpFill/>
+            <a:ln>
+              <a:noFill/>
+            </a:ln>
+          </p:spPr>
+          <p:style>
+            <a:lnRef idx="2">
+              <a:schemeClr val="accent1">
+                <a:shade val="50000"/>
+              </a:schemeClr>
+            </a:lnRef>
+            <a:fillRef idx="1">
+              <a:schemeClr val="accent1"/>
+            </a:fillRef>
+            <a:effectRef idx="0">
+              <a:schemeClr val="accent1"/>
+            </a:effectRef>
+            <a:fontRef idx="minor">
+              <a:schemeClr val="lt1"/>
+            </a:fontRef>
+          </p:style>
+          <p:txBody>
+            <a:bodyPr rtlCol="0" anchor="ctr"/>
+            <a:lstStyle/>
+            <a:p>
+              <a:pPr algn="ctr"/>
+              <a:endParaRPr lang="de-DE" dirty="0"/>
+            </a:p>
+          </p:txBody>
+        </p:sp>
+        <p:sp>
+          <p:nvSpPr>
+            <p:cNvPr id="5" name="border-bottom">
+              <a:extLst>
+                <a:ext uri="{FF2B5EF4-FFF2-40B4-BE49-F238E27FC236}">
+                  <a16:creationId xmlns:a16="http://schemas.microsoft.com/office/drawing/2014/main" id="{E5E1B807-0064-8F97-2303-BE56F8D7B0E7}"/>
+                </a:ext>
+              </a:extLst>
+            </p:cNvPr>
+            <p:cNvSpPr/>
+            <p:nvPr userDrawn="1"/>
+          </p:nvSpPr>
+          <p:spPr>
+            <a:xfrm>
+              <a:off x="0" y="6678001"/>
+              <a:ext cx="12145434" cy="180000"/>
+            </a:xfrm>
+            <a:prstGeom prst="rect">
+              <a:avLst/>
+            </a:prstGeom>
+            <a:grpFill/>
+            <a:ln>
+              <a:noFill/>
+            </a:ln>
+          </p:spPr>
+          <p:style>
+            <a:lnRef idx="2">
+              <a:schemeClr val="accent1">
+                <a:shade val="50000"/>
+              </a:schemeClr>
+            </a:lnRef>
+            <a:fillRef idx="1">
+              <a:schemeClr val="accent1"/>
+            </a:fillRef>
+            <a:effectRef idx="0">
+              <a:schemeClr val="accent1"/>
+            </a:effectRef>
+            <a:fontRef idx="minor">
+              <a:schemeClr val="lt1"/>
+            </a:fontRef>
+          </p:style>
+          <p:txBody>
+            <a:bodyPr rtlCol="0" anchor="ctr"/>
+            <a:lstStyle/>
+            <a:p>
+              <a:pPr algn="ctr"/>
+              <a:endParaRPr lang="de-DE" dirty="0"/>
+            </a:p>
+          </p:txBody>
+        </p:sp>
+        <p:sp>
+          <p:nvSpPr>
+            <p:cNvPr id="6" name="border-right">
+              <a:extLst>
+                <a:ext uri="{FF2B5EF4-FFF2-40B4-BE49-F238E27FC236}">
+                  <a16:creationId xmlns:a16="http://schemas.microsoft.com/office/drawing/2014/main" id="{1D4474D3-D9FD-89DB-A4B7-893998382520}"/>
+                </a:ext>
+              </a:extLst>
+            </p:cNvPr>
+            <p:cNvSpPr/>
+            <p:nvPr userDrawn="1"/>
+          </p:nvSpPr>
+          <p:spPr>
+            <a:xfrm>
+              <a:off x="12012000" y="-2"/>
+              <a:ext cx="180000" cy="6858002"/>
+            </a:xfrm>
+            <a:prstGeom prst="rect">
+              <a:avLst/>
+            </a:prstGeom>
+            <a:grpFill/>
+            <a:ln>
+              <a:noFill/>
+            </a:ln>
+          </p:spPr>
+          <p:style>
+            <a:lnRef idx="2">
+              <a:schemeClr val="accent1">
+                <a:shade val="50000"/>
+              </a:schemeClr>
+            </a:lnRef>
+            <a:fillRef idx="1">
+              <a:schemeClr val="accent1"/>
+            </a:fillRef>
+            <a:effectRef idx="0">
+              <a:schemeClr val="accent1"/>
+            </a:effectRef>
+            <a:fontRef idx="minor">
+              <a:schemeClr val="lt1"/>
+            </a:fontRef>
+          </p:style>
+          <p:txBody>
+            <a:bodyPr rtlCol="0" anchor="ctr"/>
+            <a:lstStyle/>
+            <a:p>
+              <a:pPr algn="ctr"/>
+              <a:endParaRPr lang="de-DE" dirty="0"/>
+            </a:p>
+          </p:txBody>
+        </p:sp>
+        <p:sp>
+          <p:nvSpPr>
+            <p:cNvPr id="7" name="border-top">
+              <a:extLst>
+                <a:ext uri="{FF2B5EF4-FFF2-40B4-BE49-F238E27FC236}">
+                  <a16:creationId xmlns:a16="http://schemas.microsoft.com/office/drawing/2014/main" id="{9EFC8305-2CDC-E9A6-5CFE-C9FEF0FC3266}"/>
+                </a:ext>
+              </a:extLst>
+            </p:cNvPr>
+            <p:cNvSpPr/>
+            <p:nvPr userDrawn="1"/>
+          </p:nvSpPr>
+          <p:spPr>
+            <a:xfrm>
+              <a:off x="0" y="-1"/>
+              <a:ext cx="12192000" cy="180000"/>
+            </a:xfrm>
+            <a:prstGeom prst="rect">
+              <a:avLst/>
+            </a:prstGeom>
+            <a:grpFill/>
+            <a:ln>
+              <a:noFill/>
+            </a:ln>
+          </p:spPr>
+          <p:style>
+            <a:lnRef idx="2">
+              <a:schemeClr val="accent1">
+                <a:shade val="50000"/>
+              </a:schemeClr>
+            </a:lnRef>
+            <a:fillRef idx="1">
+              <a:schemeClr val="accent1"/>
+            </a:fillRef>
+            <a:effectRef idx="0">
+              <a:schemeClr val="accent1"/>
+            </a:effectRef>
+            <a:fontRef idx="minor">
+              <a:schemeClr val="lt1"/>
+            </a:fontRef>
+          </p:style>
+          <p:txBody>
+            <a:bodyPr rtlCol="0" anchor="ctr"/>
+            <a:lstStyle/>
+            <a:p>
+              <a:pPr algn="ctr"/>
+              <a:endParaRPr lang="de-DE" dirty="0"/>
+            </a:p>
+          </p:txBody>
+        </p:sp>
+      </p:grpSp>
+      <p:sp>
+        <p:nvSpPr>
+          <p:cNvPr id="10" name="legend">
+            <a:extLst>
+              <a:ext uri="{FF2B5EF4-FFF2-40B4-BE49-F238E27FC236}">
+                <a16:creationId xmlns:a16="http://schemas.microsoft.com/office/drawing/2014/main" id="{F4DB992D-3358-A47E-9AC9-44A5A03B0573}"/>
+              </a:ext>
+            </a:extLst>
+          </p:cNvPr>
+          <p:cNvSpPr>
+            <a:spLocks noGrp="1"/>
+          </p:cNvSpPr>
+          <p:nvPr>
+            <p:ph type="body" sz="quarter" idx="13"/>
+          </p:nvPr>
+        </p:nvSpPr>
+        <p:spPr>
+          <a:xfrm>
+            <a:off x="410633" y="5913561"/>
+            <a:ext cx="7199035" cy="500213"/>
+          </a:xfrm>
+          <a:prstGeom prst="rect">
+            <a:avLst/>
+          </a:prstGeom>
+        </p:spPr>
+        <p:txBody>
+          <a:bodyPr anchor="b"/>
+          <a:lstStyle>
+            <a:lvl1pPr marL="0" indent="0">
+              <a:lnSpc>
+                <a:spcPct val="100000"/>
+              </a:lnSpc>
+              <a:buNone/>
+              <a:defRPr sz="600" b="0">
+                <a:solidFill>
+                  <a:schemeClr val="tx2"/>
+                </a:solidFill>
+              </a:defRPr>
+            </a:lvl1pPr>
+            <a:lvl2pPr>
+              <a:defRPr sz="2400" b="1">
+                <a:solidFill>
+                  <a:schemeClr val="tx2"/>
+                </a:solidFill>
+              </a:defRPr>
+            </a:lvl2pPr>
+            <a:lvl3pPr>
+              <a:defRPr sz="2400" b="1">
+                <a:solidFill>
+                  <a:schemeClr val="tx2"/>
+                </a:solidFill>
+              </a:defRPr>
+            </a:lvl3pPr>
+            <a:lvl4pPr>
+              <a:defRPr sz="2400" b="1">
+                <a:solidFill>
+                  <a:schemeClr val="tx2"/>
+                </a:solidFill>
+              </a:defRPr>
+            </a:lvl4pPr>
+            <a:lvl5pPr>
+              <a:defRPr sz="2400" b="1">
+                <a:solidFill>
+                  <a:schemeClr val="tx2"/>
+                </a:solidFill>
+              </a:defRPr>
+            </a:lvl5pPr>
+          </a:lstStyle>
+          <a:p>
+            <a:pPr lvl="0"/>
+            <a:r>
+              <a:rPr lang="de-DE" dirty="0"/>
+              <a:t>Mastertextformat bearbeiten</a:t>
+            </a:r>
+          </a:p>
+        </p:txBody>
+      </p:sp>
+      <p:sp>
+        <p:nvSpPr>
+          <p:cNvPr id="17" name="table">
+            <a:extLst>
+              <a:ext uri="{FF2B5EF4-FFF2-40B4-BE49-F238E27FC236}">
+                <a16:creationId xmlns:a16="http://schemas.microsoft.com/office/drawing/2014/main" id="{5567A425-0903-57CE-8A8A-EEC38629EB5A}"/>
+              </a:ext>
+            </a:extLst>
+          </p:cNvPr>
+          <p:cNvSpPr>
+            <a:spLocks noGrp="1"/>
+          </p:cNvSpPr>
+          <p:nvPr>
+            <p:ph type="pic" sz="quarter" idx="14"/>
+          </p:nvPr>
+        </p:nvSpPr>
+        <p:spPr>
+          <a:xfrm>
+            <a:off x="7800975" y="457200"/>
+            <a:ext cx="3987800" cy="5956574"/>
+          </a:xfrm>
+          <a:prstGeom prst="rect">
+            <a:avLst/>
+          </a:prstGeom>
+        </p:spPr>
+        <p:txBody>
+          <a:bodyPr/>
+          <a:lstStyle/>
+          <a:p>
+            <a:endParaRPr lang="de-DE"/>
+          </a:p>
+        </p:txBody>
+      </p:sp>
+      <p:sp>
+        <p:nvSpPr>
+          <p:cNvPr id="9" name="img-right">
+            <a:extLst>
+              <a:ext uri="{FF2B5EF4-FFF2-40B4-BE49-F238E27FC236}">
+                <a16:creationId xmlns:a16="http://schemas.microsoft.com/office/drawing/2014/main" id="{139450C4-67B1-8811-3C71-5BCCE9E167B7}"/>
+              </a:ext>
+            </a:extLst>
+          </p:cNvPr>
+          <p:cNvSpPr>
+            <a:spLocks noGrp="1"/>
+          </p:cNvSpPr>
+          <p:nvPr>
+            <p:ph type="pic" sz="quarter" idx="12"/>
+          </p:nvPr>
+        </p:nvSpPr>
+        <p:spPr>
+          <a:xfrm>
+            <a:off x="4369668" y="2540494"/>
+            <a:ext cx="3240000" cy="3302221"/>
+          </a:xfrm>
+          <a:prstGeom prst="rect">
+            <a:avLst/>
+          </a:prstGeom>
+        </p:spPr>
+        <p:txBody>
+          <a:bodyPr/>
+          <a:lstStyle/>
+          <a:p>
+            <a:endParaRPr lang="de-DE"/>
+          </a:p>
+        </p:txBody>
+      </p:sp>
+      <p:sp>
+        <p:nvSpPr>
+          <p:cNvPr id="2" name="img-left">
+            <a:extLst>
+              <a:ext uri="{FF2B5EF4-FFF2-40B4-BE49-F238E27FC236}">
+                <a16:creationId xmlns:a16="http://schemas.microsoft.com/office/drawing/2014/main" id="{F9237358-F90C-B2EE-09FC-2FE004B7E357}"/>
+              </a:ext>
+            </a:extLst>
+          </p:cNvPr>
+          <p:cNvSpPr>
+            <a:spLocks noGrp="1"/>
+          </p:cNvSpPr>
+          <p:nvPr>
+            <p:ph type="pic" sz="quarter" idx="11"/>
+          </p:nvPr>
+        </p:nvSpPr>
+        <p:spPr>
+          <a:xfrm>
+            <a:off x="410632" y="2540494"/>
+            <a:ext cx="3240000" cy="3302221"/>
+          </a:xfrm>
+          <a:prstGeom prst="rect">
+            <a:avLst/>
+          </a:prstGeom>
+        </p:spPr>
+        <p:txBody>
+          <a:bodyPr/>
+          <a:lstStyle/>
+          <a:p>
+            <a:endParaRPr lang="de-DE"/>
+          </a:p>
+        </p:txBody>
+      </p:sp>
+      <p:sp>
+        <p:nvSpPr>
+          <p:cNvPr id="14" name="caption">
+            <a:extLst>
+              <a:ext uri="{FF2B5EF4-FFF2-40B4-BE49-F238E27FC236}">
+                <a16:creationId xmlns:a16="http://schemas.microsoft.com/office/drawing/2014/main" id="{66E5D700-8C05-03E7-0FC8-DA74223B8FA1}"/>
+              </a:ext>
+            </a:extLst>
+          </p:cNvPr>
+          <p:cNvSpPr>
+            <a:spLocks noGrp="1"/>
+          </p:cNvSpPr>
+          <p:nvPr>
+            <p:ph type="body" sz="quarter" idx="10"/>
+          </p:nvPr>
+        </p:nvSpPr>
+        <p:spPr>
+          <a:xfrm>
+            <a:off x="410633" y="1325105"/>
+            <a:ext cx="7199035" cy="951162"/>
+          </a:xfrm>
+          <a:prstGeom prst="rect">
+            <a:avLst/>
+          </a:prstGeom>
+        </p:spPr>
+        <p:txBody>
+          <a:bodyPr anchor="t"/>
+          <a:lstStyle>
+            <a:lvl1pPr marL="0" indent="0">
+              <a:lnSpc>
+                <a:spcPct val="100000"/>
+              </a:lnSpc>
+              <a:buNone/>
+              <a:defRPr sz="2000" b="1">
+                <a:solidFill>
+                  <a:schemeClr val="tx2"/>
+                </a:solidFill>
+              </a:defRPr>
+            </a:lvl1pPr>
+            <a:lvl2pPr>
+              <a:defRPr sz="2400" b="1">
+                <a:solidFill>
+                  <a:schemeClr val="tx2"/>
+                </a:solidFill>
+              </a:defRPr>
+            </a:lvl2pPr>
+            <a:lvl3pPr>
+              <a:defRPr sz="2400" b="1">
+                <a:solidFill>
+                  <a:schemeClr val="tx2"/>
+                </a:solidFill>
+              </a:defRPr>
+            </a:lvl3pPr>
+            <a:lvl4pPr>
+              <a:defRPr sz="2400" b="1">
+                <a:solidFill>
+                  <a:schemeClr val="tx2"/>
+                </a:solidFill>
+              </a:defRPr>
+            </a:lvl4pPr>
+            <a:lvl5pPr>
+              <a:defRPr sz="2400" b="1">
+                <a:solidFill>
+                  <a:schemeClr val="tx2"/>
+                </a:solidFill>
+              </a:defRPr>
+            </a:lvl5pPr>
+          </a:lstStyle>
+          <a:p>
+            <a:pPr lvl="0"/>
+            <a:r>
+              <a:rPr lang="de-DE" dirty="0"/>
+              <a:t>Mastertextformat bearbeiten</a:t>
+            </a:r>
+          </a:p>
+        </p:txBody>
+      </p:sp>
+      <p:sp>
+        <p:nvSpPr>
+          <p:cNvPr id="8" name="title">
+            <a:extLst>
+              <a:ext uri="{FF2B5EF4-FFF2-40B4-BE49-F238E27FC236}">
+                <a16:creationId xmlns:a16="http://schemas.microsoft.com/office/drawing/2014/main" id="{1FF5CF18-78CE-FCC4-0FAD-559BF5132AC9}"/>
+              </a:ext>
+            </a:extLst>
+          </p:cNvPr>
+          <p:cNvSpPr>
+            <a:spLocks noGrp="1"/>
+          </p:cNvSpPr>
+          <p:nvPr>
+            <p:ph type="title" hasCustomPrompt="1"/>
+          </p:nvPr>
+        </p:nvSpPr>
+        <p:spPr>
+          <a:xfrm>
+            <a:off x="410634" y="382060"/>
+            <a:ext cx="7199034" cy="943045"/>
+          </a:xfrm>
+          <a:prstGeom prst="rect">
+            <a:avLst/>
+          </a:prstGeom>
+        </p:spPr>
+        <p:txBody>
+          <a:bodyPr/>
+          <a:lstStyle>
+            <a:lvl1pPr>
+              <a:defRPr sz="5400">
+                <a:solidFill>
+                  <a:schemeClr val="accent1"/>
+                </a:solidFill>
+                <a:latin typeface="Vidaloka " panose="02000504000000020004" pitchFamily="2" charset="0"/>
+              </a:defRPr>
+            </a:lvl1pPr>
+          </a:lstStyle>
+          <a:p>
+            <a:r>
+              <a:rPr lang="de-DE" dirty="0" err="1"/>
+              <a:t>Personnel</a:t>
+            </a:r>
+            <a:r>
+              <a:rPr lang="de-DE" dirty="0"/>
+              <a:t> </a:t>
+            </a:r>
+            <a:r>
+              <a:rPr lang="de-DE" dirty="0" err="1"/>
+              <a:t>Groupings</a:t>
+            </a:r>
+            <a:endParaRPr lang="de-DE" dirty="0"/>
+          </a:p>
+        </p:txBody>
+      </p:sp>
+    </p:spTree>
+    <p:extLst>
+      <p:ext uri="{BB962C8B-B14F-4D97-AF65-F5344CB8AC3E}">
+        <p14:creationId xmlns:p14="http://schemas.microsoft.com/office/powerpoint/2010/main" val="2696216825"/>
+      </p:ext>
+    </p:extLst>
+  </p:cSld>
+  <p:clrMapOvr>
+    <a:masterClrMapping/>
+  </p:clrMapOvr>
+</p:sldLayout>
+</file>
+
+<file path=ppt/slideLayouts/slideLayout9.xml><?xml version="1.0" encoding="utf-8"?>
+<p:sldLayout xmlns:a="http://schemas.openxmlformats.org/drawingml/2006/main" xmlns:r="http://schemas.openxmlformats.org/officeDocument/2006/relationships" xmlns:p="http://schemas.openxmlformats.org/presentationml/2006/main" preserve="1" userDrawn="1">
   <p:cSld name="Team Report Ranks">
     <p:spTree>
       <p:nvGrpSpPr>
@@ -3505,388 +4637,16 @@
 </p:sldLayout>
 </file>
 
-<file path=ppt/slideLayouts/slideLayout9.xml><?xml version="1.0" encoding="utf-8"?>
-<p:sldLayout xmlns:a="http://schemas.openxmlformats.org/drawingml/2006/main" xmlns:r="http://schemas.openxmlformats.org/officeDocument/2006/relationships" xmlns:p="http://schemas.openxmlformats.org/presentationml/2006/main" preserve="1" userDrawn="1">
-  <p:cSld name="Inhalt">
-    <p:spTree>
-      <p:nvGrpSpPr>
-        <p:cNvPr id="1" name=""/>
-        <p:cNvGrpSpPr/>
-        <p:nvPr/>
-      </p:nvGrpSpPr>
-      <p:grpSpPr>
-        <a:xfrm>
-          <a:off x="0" y="0"/>
-          <a:ext cx="0" cy="0"/>
-          <a:chOff x="0" y="0"/>
-          <a:chExt cx="0" cy="0"/>
-        </a:xfrm>
-      </p:grpSpPr>
-      <p:grpSp>
-        <p:nvGrpSpPr>
-          <p:cNvPr id="22" name="border">
-            <a:extLst>
-              <a:ext uri="{FF2B5EF4-FFF2-40B4-BE49-F238E27FC236}">
-                <a16:creationId xmlns:a16="http://schemas.microsoft.com/office/drawing/2014/main" id="{B8D0B26B-281F-D7A3-D584-65D016783949}"/>
-              </a:ext>
-            </a:extLst>
-          </p:cNvPr>
-          <p:cNvGrpSpPr/>
-          <p:nvPr userDrawn="1"/>
-        </p:nvGrpSpPr>
-        <p:grpSpPr>
-          <a:xfrm>
-            <a:off x="0" y="-2"/>
-            <a:ext cx="12192000" cy="6858004"/>
-            <a:chOff x="0" y="-2"/>
-            <a:chExt cx="12192000" cy="6858004"/>
-          </a:xfrm>
-          <a:solidFill>
-            <a:schemeClr val="tx1"/>
-          </a:solidFill>
-        </p:grpSpPr>
-        <p:sp>
-          <p:nvSpPr>
-            <p:cNvPr id="23" name="border-left">
-              <a:extLst>
-                <a:ext uri="{FF2B5EF4-FFF2-40B4-BE49-F238E27FC236}">
-                  <a16:creationId xmlns:a16="http://schemas.microsoft.com/office/drawing/2014/main" id="{24D1C0E4-0082-A121-25D9-0C67CB2C0947}"/>
-                </a:ext>
-              </a:extLst>
-            </p:cNvPr>
-            <p:cNvSpPr/>
-            <p:nvPr userDrawn="1"/>
-          </p:nvSpPr>
-          <p:spPr>
-            <a:xfrm>
-              <a:off x="4681" y="0"/>
-              <a:ext cx="180000" cy="6858002"/>
-            </a:xfrm>
-            <a:prstGeom prst="rect">
-              <a:avLst/>
-            </a:prstGeom>
-            <a:grpFill/>
-            <a:ln>
-              <a:noFill/>
-            </a:ln>
-          </p:spPr>
-          <p:style>
-            <a:lnRef idx="2">
-              <a:schemeClr val="accent1">
-                <a:shade val="50000"/>
-              </a:schemeClr>
-            </a:lnRef>
-            <a:fillRef idx="1">
-              <a:schemeClr val="accent1"/>
-            </a:fillRef>
-            <a:effectRef idx="0">
-              <a:schemeClr val="accent1"/>
-            </a:effectRef>
-            <a:fontRef idx="minor">
-              <a:schemeClr val="lt1"/>
-            </a:fontRef>
-          </p:style>
-          <p:txBody>
-            <a:bodyPr rtlCol="0" anchor="ctr"/>
-            <a:lstStyle/>
-            <a:p>
-              <a:pPr algn="ctr"/>
-              <a:endParaRPr lang="de-DE" dirty="0"/>
-            </a:p>
-          </p:txBody>
-        </p:sp>
-        <p:sp>
-          <p:nvSpPr>
-            <p:cNvPr id="24" name="border-bottom">
-              <a:extLst>
-                <a:ext uri="{FF2B5EF4-FFF2-40B4-BE49-F238E27FC236}">
-                  <a16:creationId xmlns:a16="http://schemas.microsoft.com/office/drawing/2014/main" id="{3AC2A2C3-DBE9-EED1-ADED-9550DAF09168}"/>
-                </a:ext>
-              </a:extLst>
-            </p:cNvPr>
-            <p:cNvSpPr/>
-            <p:nvPr userDrawn="1"/>
-          </p:nvSpPr>
-          <p:spPr>
-            <a:xfrm>
-              <a:off x="0" y="6678001"/>
-              <a:ext cx="12145434" cy="180000"/>
-            </a:xfrm>
-            <a:prstGeom prst="rect">
-              <a:avLst/>
-            </a:prstGeom>
-            <a:grpFill/>
-            <a:ln>
-              <a:noFill/>
-            </a:ln>
-          </p:spPr>
-          <p:style>
-            <a:lnRef idx="2">
-              <a:schemeClr val="accent1">
-                <a:shade val="50000"/>
-              </a:schemeClr>
-            </a:lnRef>
-            <a:fillRef idx="1">
-              <a:schemeClr val="accent1"/>
-            </a:fillRef>
-            <a:effectRef idx="0">
-              <a:schemeClr val="accent1"/>
-            </a:effectRef>
-            <a:fontRef idx="minor">
-              <a:schemeClr val="lt1"/>
-            </a:fontRef>
-          </p:style>
-          <p:txBody>
-            <a:bodyPr rtlCol="0" anchor="ctr"/>
-            <a:lstStyle/>
-            <a:p>
-              <a:pPr algn="ctr"/>
-              <a:endParaRPr lang="de-DE" dirty="0"/>
-            </a:p>
-          </p:txBody>
-        </p:sp>
-        <p:sp>
-          <p:nvSpPr>
-            <p:cNvPr id="25" name="border-right">
-              <a:extLst>
-                <a:ext uri="{FF2B5EF4-FFF2-40B4-BE49-F238E27FC236}">
-                  <a16:creationId xmlns:a16="http://schemas.microsoft.com/office/drawing/2014/main" id="{88443614-9F3A-8AE7-F32B-2638B18358B5}"/>
-                </a:ext>
-              </a:extLst>
-            </p:cNvPr>
-            <p:cNvSpPr/>
-            <p:nvPr userDrawn="1"/>
-          </p:nvSpPr>
-          <p:spPr>
-            <a:xfrm>
-              <a:off x="12012000" y="-2"/>
-              <a:ext cx="180000" cy="6858002"/>
-            </a:xfrm>
-            <a:prstGeom prst="rect">
-              <a:avLst/>
-            </a:prstGeom>
-            <a:grpFill/>
-            <a:ln>
-              <a:noFill/>
-            </a:ln>
-          </p:spPr>
-          <p:style>
-            <a:lnRef idx="2">
-              <a:schemeClr val="accent1">
-                <a:shade val="50000"/>
-              </a:schemeClr>
-            </a:lnRef>
-            <a:fillRef idx="1">
-              <a:schemeClr val="accent1"/>
-            </a:fillRef>
-            <a:effectRef idx="0">
-              <a:schemeClr val="accent1"/>
-            </a:effectRef>
-            <a:fontRef idx="minor">
-              <a:schemeClr val="lt1"/>
-            </a:fontRef>
-          </p:style>
-          <p:txBody>
-            <a:bodyPr rtlCol="0" anchor="ctr"/>
-            <a:lstStyle/>
-            <a:p>
-              <a:pPr algn="ctr"/>
-              <a:endParaRPr lang="de-DE" dirty="0"/>
-            </a:p>
-          </p:txBody>
-        </p:sp>
-        <p:sp>
-          <p:nvSpPr>
-            <p:cNvPr id="26" name="border-top">
-              <a:extLst>
-                <a:ext uri="{FF2B5EF4-FFF2-40B4-BE49-F238E27FC236}">
-                  <a16:creationId xmlns:a16="http://schemas.microsoft.com/office/drawing/2014/main" id="{AC40C3CA-D995-E3BD-B3ED-BA688F19C2C4}"/>
-                </a:ext>
-              </a:extLst>
-            </p:cNvPr>
-            <p:cNvSpPr/>
-            <p:nvPr userDrawn="1"/>
-          </p:nvSpPr>
-          <p:spPr>
-            <a:xfrm>
-              <a:off x="0" y="-1"/>
-              <a:ext cx="12192000" cy="180000"/>
-            </a:xfrm>
-            <a:prstGeom prst="rect">
-              <a:avLst/>
-            </a:prstGeom>
-            <a:grpFill/>
-            <a:ln>
-              <a:noFill/>
-            </a:ln>
-          </p:spPr>
-          <p:style>
-            <a:lnRef idx="2">
-              <a:schemeClr val="accent1">
-                <a:shade val="50000"/>
-              </a:schemeClr>
-            </a:lnRef>
-            <a:fillRef idx="1">
-              <a:schemeClr val="accent1"/>
-            </a:fillRef>
-            <a:effectRef idx="0">
-              <a:schemeClr val="accent1"/>
-            </a:effectRef>
-            <a:fontRef idx="minor">
-              <a:schemeClr val="lt1"/>
-            </a:fontRef>
-          </p:style>
-          <p:txBody>
-            <a:bodyPr rtlCol="0" anchor="ctr"/>
-            <a:lstStyle/>
-            <a:p>
-              <a:pPr algn="ctr"/>
-              <a:endParaRPr lang="de-DE" dirty="0"/>
-            </a:p>
-          </p:txBody>
-        </p:sp>
-      </p:grpSp>
-      <p:sp>
-        <p:nvSpPr>
-          <p:cNvPr id="2" name="title">
-            <a:extLst>
-              <a:ext uri="{FF2B5EF4-FFF2-40B4-BE49-F238E27FC236}">
-                <a16:creationId xmlns:a16="http://schemas.microsoft.com/office/drawing/2014/main" id="{4AE85176-057C-9E1E-E17C-7F530410CB2C}"/>
-              </a:ext>
-            </a:extLst>
-          </p:cNvPr>
-          <p:cNvSpPr>
-            <a:spLocks noGrp="1"/>
-          </p:cNvSpPr>
-          <p:nvPr>
-            <p:ph type="title"/>
-          </p:nvPr>
-        </p:nvSpPr>
-        <p:spPr>
-          <a:xfrm>
-            <a:off x="410634" y="382060"/>
-            <a:ext cx="11349566" cy="815974"/>
-          </a:xfrm>
-          <a:prstGeom prst="rect">
-            <a:avLst/>
-          </a:prstGeom>
-        </p:spPr>
-        <p:txBody>
-          <a:bodyPr/>
-          <a:lstStyle>
-            <a:lvl1pPr>
-              <a:defRPr sz="6000"/>
-            </a:lvl1pPr>
-          </a:lstStyle>
-          <a:p>
-            <a:r>
-              <a:rPr lang="de-DE" dirty="0"/>
-              <a:t>Mastertitelformat bearbeiten</a:t>
-            </a:r>
-          </a:p>
-        </p:txBody>
-      </p:sp>
-      <p:sp>
-        <p:nvSpPr>
-          <p:cNvPr id="30" name="content">
-            <a:extLst>
-              <a:ext uri="{FF2B5EF4-FFF2-40B4-BE49-F238E27FC236}">
-                <a16:creationId xmlns:a16="http://schemas.microsoft.com/office/drawing/2014/main" id="{AA2F0873-9110-E430-44EF-097D36A3E36A}"/>
-              </a:ext>
-            </a:extLst>
-          </p:cNvPr>
-          <p:cNvSpPr>
-            <a:spLocks noGrp="1"/>
-          </p:cNvSpPr>
-          <p:nvPr>
-            <p:ph type="body" sz="quarter" idx="11"/>
-          </p:nvPr>
-        </p:nvSpPr>
-        <p:spPr>
-          <a:xfrm>
-            <a:off x="410633" y="1617133"/>
-            <a:ext cx="11349567" cy="4858805"/>
-          </a:xfrm>
-          <a:prstGeom prst="rect">
-            <a:avLst/>
-          </a:prstGeom>
-        </p:spPr>
-        <p:txBody>
-          <a:bodyPr/>
-          <a:lstStyle>
-            <a:lvl1pPr>
-              <a:defRPr sz="2000"/>
-            </a:lvl1pPr>
-            <a:lvl2pPr>
-              <a:defRPr sz="2000"/>
-            </a:lvl2pPr>
-            <a:lvl3pPr>
-              <a:defRPr sz="2000"/>
-            </a:lvl3pPr>
-            <a:lvl4pPr>
-              <a:defRPr sz="2000"/>
-            </a:lvl4pPr>
-            <a:lvl5pPr>
-              <a:defRPr sz="2000"/>
-            </a:lvl5pPr>
-          </a:lstStyle>
-          <a:p>
-            <a:pPr lvl="0"/>
-            <a:r>
-              <a:rPr lang="de-DE" dirty="0"/>
-              <a:t>Mastertextformat bearbeiten</a:t>
-            </a:r>
-          </a:p>
-          <a:p>
-            <a:pPr lvl="1"/>
-            <a:r>
-              <a:rPr lang="de-DE" dirty="0"/>
-              <a:t>Zweite Ebene</a:t>
-            </a:r>
-          </a:p>
-          <a:p>
-            <a:pPr lvl="2"/>
-            <a:r>
-              <a:rPr lang="de-DE" dirty="0"/>
-              <a:t>Dritte Ebene</a:t>
-            </a:r>
-          </a:p>
-          <a:p>
-            <a:pPr lvl="3"/>
-            <a:r>
-              <a:rPr lang="de-DE" dirty="0"/>
-              <a:t>Vierte Ebene</a:t>
-            </a:r>
-          </a:p>
-          <a:p>
-            <a:pPr lvl="4"/>
-            <a:r>
-              <a:rPr lang="de-DE" dirty="0"/>
-              <a:t>Fünfte Ebene</a:t>
-            </a:r>
-          </a:p>
-        </p:txBody>
-      </p:sp>
-    </p:spTree>
-    <p:extLst>
-      <p:ext uri="{BB962C8B-B14F-4D97-AF65-F5344CB8AC3E}">
-        <p14:creationId xmlns:p14="http://schemas.microsoft.com/office/powerpoint/2010/main" val="554388420"/>
-      </p:ext>
-    </p:extLst>
-  </p:cSld>
-  <p:clrMapOvr>
-    <a:masterClrMapping/>
-  </p:clrMapOvr>
-</p:sldLayout>
-</file>
-
 <file path=ppt/slideMasters/slideMaster1.xml><?xml version="1.0" encoding="utf-8"?>
 <p:sldMaster xmlns:a="http://schemas.openxmlformats.org/drawingml/2006/main" xmlns:r="http://schemas.openxmlformats.org/officeDocument/2006/relationships" xmlns:p="http://schemas.openxmlformats.org/presentationml/2006/main" preserve="1">
   <p:cSld>
     <p:bg>
-      <p:bgRef idx="1001">
-        <a:schemeClr val="bg2"/>
-      </p:bgRef>
+      <p:bgPr>
+        <a:solidFill>
+          <a:srgbClr val="222F3E"/>
+        </a:solidFill>
+        <a:effectLst/>
+      </p:bgPr>
     </p:bg>
     <p:spTree>
       <p:nvGrpSpPr>
@@ -3918,8 +4678,9 @@
     <p:sldLayoutId id="2147483665" r:id="rId5"/>
     <p:sldLayoutId id="2147483679" r:id="rId6"/>
     <p:sldLayoutId id="2147483661" r:id="rId7"/>
-    <p:sldLayoutId id="2147483662" r:id="rId8"/>
-    <p:sldLayoutId id="2147483680" r:id="rId9"/>
+    <p:sldLayoutId id="2147483682" r:id="rId8"/>
+    <p:sldLayoutId id="2147483662" r:id="rId9"/>
+    <p:sldLayoutId id="2147483680" r:id="rId10"/>
   </p:sldLayoutIdLst>
   <p:txStyles>
     <p:titleStyle>
@@ -4310,24 +5071,104 @@
 </p:sld>
 </file>
 
+<file path=ppt/slides/slide2.xml><?xml version="1.0" encoding="utf-8"?>
+<p:sld xmlns:a="http://schemas.openxmlformats.org/drawingml/2006/main" xmlns:r="http://schemas.openxmlformats.org/officeDocument/2006/relationships" xmlns:p="http://schemas.openxmlformats.org/presentationml/2006/main">
+  <p:cSld>
+    <p:spTree>
+      <p:nvGrpSpPr>
+        <p:cNvPr id="1" name=""/>
+        <p:cNvGrpSpPr/>
+        <p:nvPr/>
+      </p:nvGrpSpPr>
+      <p:grpSpPr>
+        <a:xfrm>
+          <a:off x="0" y="0"/>
+          <a:ext cx="0" cy="0"/>
+          <a:chOff x="0" y="0"/>
+          <a:chExt cx="0" cy="0"/>
+        </a:xfrm>
+      </p:grpSpPr>
+      <p:sp>
+        <p:nvSpPr>
+          <p:cNvPr id="2" name="Textplatzhalter 1">
+            <a:extLst>
+              <a:ext uri="{FF2B5EF4-FFF2-40B4-BE49-F238E27FC236}">
+                <a16:creationId xmlns:a16="http://schemas.microsoft.com/office/drawing/2014/main" id="{9A9DFBE3-BA49-503F-6921-D77DB4A14ECE}"/>
+              </a:ext>
+            </a:extLst>
+          </p:cNvPr>
+          <p:cNvSpPr>
+            <a:spLocks noGrp="1"/>
+          </p:cNvSpPr>
+          <p:nvPr>
+            <p:ph type="body" sz="quarter" idx="10"/>
+          </p:nvPr>
+        </p:nvSpPr>
+        <p:spPr/>
+        <p:txBody>
+          <a:bodyPr/>
+          <a:lstStyle/>
+          <a:p>
+            <a:endParaRPr lang="de-DE"/>
+          </a:p>
+        </p:txBody>
+      </p:sp>
+      <p:sp>
+        <p:nvSpPr>
+          <p:cNvPr id="3" name="Titel 2">
+            <a:extLst>
+              <a:ext uri="{FF2B5EF4-FFF2-40B4-BE49-F238E27FC236}">
+                <a16:creationId xmlns:a16="http://schemas.microsoft.com/office/drawing/2014/main" id="{A84F22DF-A30A-C1CA-55BC-727DDEF9C405}"/>
+              </a:ext>
+            </a:extLst>
+          </p:cNvPr>
+          <p:cNvSpPr>
+            <a:spLocks noGrp="1"/>
+          </p:cNvSpPr>
+          <p:nvPr>
+            <p:ph type="title"/>
+          </p:nvPr>
+        </p:nvSpPr>
+        <p:spPr/>
+        <p:txBody>
+          <a:bodyPr/>
+          <a:lstStyle/>
+          <a:p>
+            <a:endParaRPr lang="de-DE" dirty="0"/>
+          </a:p>
+        </p:txBody>
+      </p:sp>
+    </p:spTree>
+    <p:extLst>
+      <p:ext uri="{BB962C8B-B14F-4D97-AF65-F5344CB8AC3E}">
+        <p14:creationId xmlns:p14="http://schemas.microsoft.com/office/powerpoint/2010/main" val="2870668492"/>
+      </p:ext>
+    </p:extLst>
+  </p:cSld>
+  <p:clrMapOvr>
+    <a:masterClrMapping/>
+  </p:clrMapOvr>
+</p:sld>
+</file>
+
 <file path=ppt/theme/theme1.xml><?xml version="1.0" encoding="utf-8"?>
 <a:theme xmlns:a="http://schemas.openxmlformats.org/drawingml/2006/main" name="Office Theme">
   <a:themeElements>
-    <a:clrScheme name="RFL">
+    <a:clrScheme name="Benutzerdefiniert 1">
       <a:dk1>
-        <a:srgbClr val="00183C"/>
+        <a:srgbClr val="222F3E"/>
       </a:dk1>
       <a:lt1>
-        <a:sysClr val="window" lastClr="FFFFFF"/>
+        <a:srgbClr val="FFFFFF"/>
       </a:lt1>
       <a:dk2>
-        <a:srgbClr val="00183C"/>
+        <a:srgbClr val="222F3E"/>
       </a:dk2>
       <a:lt2>
-        <a:srgbClr val="FFFFFF"/>
+        <a:srgbClr val="C8D6E5"/>
       </a:lt2>
       <a:accent1>
-        <a:srgbClr val="E2001C"/>
+        <a:srgbClr val="FECA57"/>
       </a:accent1>
       <a:accent2>
         <a:srgbClr val="EB9B03"/>
@@ -4353,7 +5194,7 @@
     </a:clrScheme>
     <a:fontScheme name="RFL">
       <a:majorFont>
-        <a:latin typeface="ALT ROGUE"/>
+        <a:latin typeface="Vidaloka "/>
         <a:ea typeface=""/>
         <a:cs typeface=""/>
       </a:majorFont>
@@ -4804,4 +5645,299 @@
     </a:ext>
   </a:extLst>
 </a:theme>
+</file>
+
+<file path=ppt/theme/theme3.xml><?xml version="1.0" encoding="utf-8"?>
+<a:theme xmlns:a="http://schemas.openxmlformats.org/drawingml/2006/main" name="Office">
+  <a:themeElements>
+    <a:clrScheme name="Office">
+      <a:dk1>
+        <a:sysClr val="windowText" lastClr="000000"/>
+      </a:dk1>
+      <a:lt1>
+        <a:sysClr val="window" lastClr="FFFFFF"/>
+      </a:lt1>
+      <a:dk2>
+        <a:srgbClr val="44546A"/>
+      </a:dk2>
+      <a:lt2>
+        <a:srgbClr val="E7E6E6"/>
+      </a:lt2>
+      <a:accent1>
+        <a:srgbClr val="4472C4"/>
+      </a:accent1>
+      <a:accent2>
+        <a:srgbClr val="ED7D31"/>
+      </a:accent2>
+      <a:accent3>
+        <a:srgbClr val="A5A5A5"/>
+      </a:accent3>
+      <a:accent4>
+        <a:srgbClr val="FFC000"/>
+      </a:accent4>
+      <a:accent5>
+        <a:srgbClr val="5B9BD5"/>
+      </a:accent5>
+      <a:accent6>
+        <a:srgbClr val="70AD47"/>
+      </a:accent6>
+      <a:hlink>
+        <a:srgbClr val="0563C1"/>
+      </a:hlink>
+      <a:folHlink>
+        <a:srgbClr val="954F72"/>
+      </a:folHlink>
+    </a:clrScheme>
+    <a:fontScheme name="Office">
+      <a:majorFont>
+        <a:latin typeface="Calibri Light" panose="020F0302020204030204"/>
+        <a:ea typeface=""/>
+        <a:cs typeface=""/>
+        <a:font script="Jpan" typeface="游ゴシック Light"/>
+        <a:font script="Hang" typeface="맑은 고딕"/>
+        <a:font script="Hans" typeface="等线 Light"/>
+        <a:font script="Hant" typeface="新細明體"/>
+        <a:font script="Arab" typeface="Times New Roman"/>
+        <a:font script="Hebr" typeface="Times New Roman"/>
+        <a:font script="Thai" typeface="Angsana New"/>
+        <a:font script="Ethi" typeface="Nyala"/>
+        <a:font script="Beng" typeface="Vrinda"/>
+        <a:font script="Gujr" typeface="Shruti"/>
+        <a:font script="Khmr" typeface="MoolBoran"/>
+        <a:font script="Knda" typeface="Tunga"/>
+        <a:font script="Guru" typeface="Raavi"/>
+        <a:font script="Cans" typeface="Euphemia"/>
+        <a:font script="Cher" typeface="Plantagenet Cherokee"/>
+        <a:font script="Yiii" typeface="Microsoft Yi Baiti"/>
+        <a:font script="Tibt" typeface="Microsoft Himalaya"/>
+        <a:font script="Thaa" typeface="MV Boli"/>
+        <a:font script="Deva" typeface="Mangal"/>
+        <a:font script="Telu" typeface="Gautami"/>
+        <a:font script="Taml" typeface="Latha"/>
+        <a:font script="Syrc" typeface="Estrangelo Edessa"/>
+        <a:font script="Orya" typeface="Kalinga"/>
+        <a:font script="Mlym" typeface="Kartika"/>
+        <a:font script="Laoo" typeface="DokChampa"/>
+        <a:font script="Sinh" typeface="Iskoola Pota"/>
+        <a:font script="Mong" typeface="Mongolian Baiti"/>
+        <a:font script="Viet" typeface="Times New Roman"/>
+        <a:font script="Uigh" typeface="Microsoft Uighur"/>
+        <a:font script="Geor" typeface="Sylfaen"/>
+        <a:font script="Armn" typeface="Arial"/>
+        <a:font script="Bugi" typeface="Leelawadee UI"/>
+        <a:font script="Bopo" typeface="Microsoft JhengHei"/>
+        <a:font script="Java" typeface="Javanese Text"/>
+        <a:font script="Lisu" typeface="Segoe UI"/>
+        <a:font script="Mymr" typeface="Myanmar Text"/>
+        <a:font script="Nkoo" typeface="Ebrima"/>
+        <a:font script="Olck" typeface="Nirmala UI"/>
+        <a:font script="Osma" typeface="Ebrima"/>
+        <a:font script="Phag" typeface="Phagspa"/>
+        <a:font script="Syrn" typeface="Estrangelo Edessa"/>
+        <a:font script="Syrj" typeface="Estrangelo Edessa"/>
+        <a:font script="Syre" typeface="Estrangelo Edessa"/>
+        <a:font script="Sora" typeface="Nirmala UI"/>
+        <a:font script="Tale" typeface="Microsoft Tai Le"/>
+        <a:font script="Talu" typeface="Microsoft New Tai Lue"/>
+        <a:font script="Tfng" typeface="Ebrima"/>
+      </a:majorFont>
+      <a:minorFont>
+        <a:latin typeface="Calibri" panose="020F0502020204030204"/>
+        <a:ea typeface=""/>
+        <a:cs typeface=""/>
+        <a:font script="Jpan" typeface="游ゴシック"/>
+        <a:font script="Hang" typeface="맑은 고딕"/>
+        <a:font script="Hans" typeface="等线"/>
+        <a:font script="Hant" typeface="新細明體"/>
+        <a:font script="Arab" typeface="Arial"/>
+        <a:font script="Hebr" typeface="Arial"/>
+        <a:font script="Thai" typeface="Cordia New"/>
+        <a:font script="Ethi" typeface="Nyala"/>
+        <a:font script="Beng" typeface="Vrinda"/>
+        <a:font script="Gujr" typeface="Shruti"/>
+        <a:font script="Khmr" typeface="DaunPenh"/>
+        <a:font script="Knda" typeface="Tunga"/>
+        <a:font script="Guru" typeface="Raavi"/>
+        <a:font script="Cans" typeface="Euphemia"/>
+        <a:font script="Cher" typeface="Plantagenet Cherokee"/>
+        <a:font script="Yiii" typeface="Microsoft Yi Baiti"/>
+        <a:font script="Tibt" typeface="Microsoft Himalaya"/>
+        <a:font script="Thaa" typeface="MV Boli"/>
+        <a:font script="Deva" typeface="Mangal"/>
+        <a:font script="Telu" typeface="Gautami"/>
+        <a:font script="Taml" typeface="Latha"/>
+        <a:font script="Syrc" typeface="Estrangelo Edessa"/>
+        <a:font script="Orya" typeface="Kalinga"/>
+        <a:font script="Mlym" typeface="Kartika"/>
+        <a:font script="Laoo" typeface="DokChampa"/>
+        <a:font script="Sinh" typeface="Iskoola Pota"/>
+        <a:font script="Mong" typeface="Mongolian Baiti"/>
+        <a:font script="Viet" typeface="Arial"/>
+        <a:font script="Uigh" typeface="Microsoft Uighur"/>
+        <a:font script="Geor" typeface="Sylfaen"/>
+        <a:font script="Armn" typeface="Arial"/>
+        <a:font script="Bugi" typeface="Leelawadee UI"/>
+        <a:font script="Bopo" typeface="Microsoft JhengHei"/>
+        <a:font script="Java" typeface="Javanese Text"/>
+        <a:font script="Lisu" typeface="Segoe UI"/>
+        <a:font script="Mymr" typeface="Myanmar Text"/>
+        <a:font script="Nkoo" typeface="Ebrima"/>
+        <a:font script="Olck" typeface="Nirmala UI"/>
+        <a:font script="Osma" typeface="Ebrima"/>
+        <a:font script="Phag" typeface="Phagspa"/>
+        <a:font script="Syrn" typeface="Estrangelo Edessa"/>
+        <a:font script="Syrj" typeface="Estrangelo Edessa"/>
+        <a:font script="Syre" typeface="Estrangelo Edessa"/>
+        <a:font script="Sora" typeface="Nirmala UI"/>
+        <a:font script="Tale" typeface="Microsoft Tai Le"/>
+        <a:font script="Talu" typeface="Microsoft New Tai Lue"/>
+        <a:font script="Tfng" typeface="Ebrima"/>
+      </a:minorFont>
+    </a:fontScheme>
+    <a:fmtScheme name="Office">
+      <a:fillStyleLst>
+        <a:solidFill>
+          <a:schemeClr val="phClr"/>
+        </a:solidFill>
+        <a:gradFill rotWithShape="1">
+          <a:gsLst>
+            <a:gs pos="0">
+              <a:schemeClr val="phClr">
+                <a:lumMod val="110000"/>
+                <a:satMod val="105000"/>
+                <a:tint val="67000"/>
+              </a:schemeClr>
+            </a:gs>
+            <a:gs pos="50000">
+              <a:schemeClr val="phClr">
+                <a:lumMod val="105000"/>
+                <a:satMod val="103000"/>
+                <a:tint val="73000"/>
+              </a:schemeClr>
+            </a:gs>
+            <a:gs pos="100000">
+              <a:schemeClr val="phClr">
+                <a:lumMod val="105000"/>
+                <a:satMod val="109000"/>
+                <a:tint val="81000"/>
+              </a:schemeClr>
+            </a:gs>
+          </a:gsLst>
+          <a:lin ang="5400000" scaled="0"/>
+        </a:gradFill>
+        <a:gradFill rotWithShape="1">
+          <a:gsLst>
+            <a:gs pos="0">
+              <a:schemeClr val="phClr">
+                <a:satMod val="103000"/>
+                <a:lumMod val="102000"/>
+                <a:tint val="94000"/>
+              </a:schemeClr>
+            </a:gs>
+            <a:gs pos="50000">
+              <a:schemeClr val="phClr">
+                <a:satMod val="110000"/>
+                <a:lumMod val="100000"/>
+                <a:shade val="100000"/>
+              </a:schemeClr>
+            </a:gs>
+            <a:gs pos="100000">
+              <a:schemeClr val="phClr">
+                <a:lumMod val="99000"/>
+                <a:satMod val="120000"/>
+                <a:shade val="78000"/>
+              </a:schemeClr>
+            </a:gs>
+          </a:gsLst>
+          <a:lin ang="5400000" scaled="0"/>
+        </a:gradFill>
+      </a:fillStyleLst>
+      <a:lnStyleLst>
+        <a:ln w="6350" cap="flat" cmpd="sng" algn="ctr">
+          <a:solidFill>
+            <a:schemeClr val="phClr"/>
+          </a:solidFill>
+          <a:prstDash val="solid"/>
+          <a:miter lim="800000"/>
+        </a:ln>
+        <a:ln w="12700" cap="flat" cmpd="sng" algn="ctr">
+          <a:solidFill>
+            <a:schemeClr val="phClr"/>
+          </a:solidFill>
+          <a:prstDash val="solid"/>
+          <a:miter lim="800000"/>
+        </a:ln>
+        <a:ln w="19050" cap="flat" cmpd="sng" algn="ctr">
+          <a:solidFill>
+            <a:schemeClr val="phClr"/>
+          </a:solidFill>
+          <a:prstDash val="solid"/>
+          <a:miter lim="800000"/>
+        </a:ln>
+      </a:lnStyleLst>
+      <a:effectStyleLst>
+        <a:effectStyle>
+          <a:effectLst/>
+        </a:effectStyle>
+        <a:effectStyle>
+          <a:effectLst/>
+        </a:effectStyle>
+        <a:effectStyle>
+          <a:effectLst>
+            <a:outerShdw blurRad="57150" dist="19050" dir="5400000" algn="ctr" rotWithShape="0">
+              <a:srgbClr val="000000">
+                <a:alpha val="63000"/>
+              </a:srgbClr>
+            </a:outerShdw>
+          </a:effectLst>
+        </a:effectStyle>
+      </a:effectStyleLst>
+      <a:bgFillStyleLst>
+        <a:solidFill>
+          <a:schemeClr val="phClr"/>
+        </a:solidFill>
+        <a:solidFill>
+          <a:schemeClr val="phClr">
+            <a:tint val="95000"/>
+            <a:satMod val="170000"/>
+          </a:schemeClr>
+        </a:solidFill>
+        <a:gradFill rotWithShape="1">
+          <a:gsLst>
+            <a:gs pos="0">
+              <a:schemeClr val="phClr">
+                <a:tint val="93000"/>
+                <a:satMod val="150000"/>
+                <a:shade val="98000"/>
+                <a:lumMod val="102000"/>
+              </a:schemeClr>
+            </a:gs>
+            <a:gs pos="50000">
+              <a:schemeClr val="phClr">
+                <a:tint val="98000"/>
+                <a:satMod val="130000"/>
+                <a:shade val="90000"/>
+                <a:lumMod val="103000"/>
+              </a:schemeClr>
+            </a:gs>
+            <a:gs pos="100000">
+              <a:schemeClr val="phClr">
+                <a:shade val="63000"/>
+                <a:satMod val="120000"/>
+              </a:schemeClr>
+            </a:gs>
+          </a:gsLst>
+          <a:lin ang="5400000" scaled="0"/>
+        </a:gradFill>
+      </a:bgFillStyleLst>
+    </a:fmtScheme>
+  </a:themeElements>
+  <a:objectDefaults/>
+  <a:extraClrSchemeLst/>
+  <a:extLst>
+    <a:ext uri="{05A4C25C-085E-4340-85A3-A5531E510DB2}">
+      <thm15:themeFamily xmlns:thm15="http://schemas.microsoft.com/office/thememl/2012/main" name="Office Theme" id="{62F939B6-93AF-4DB8-9C6B-D6C7DFDC589F}" vid="{4A3C46E8-61CC-4603-A589-7422A47A8E4A}"/>
+    </a:ext>
+  </a:extLst>
+</a:theme>
 </file>
</xml_diff>